<commit_message>
Added Elaboration Plan slides to Sprint1Presentation
</commit_message>
<xml_diff>
--- a/Sprint1Presentation.pptx
+++ b/Sprint1Presentation.pptx
@@ -5,10 +5,10 @@
     <p:sldMasterId id="2147483672" r:id="rId2"/>
   </p:sldMasterIdLst>
   <p:notesMasterIdLst>
-    <p:notesMasterId r:id="rId15"/>
+    <p:notesMasterId r:id="rId16"/>
   </p:notesMasterIdLst>
   <p:handoutMasterIdLst>
-    <p:handoutMasterId r:id="rId16"/>
+    <p:handoutMasterId r:id="rId17"/>
   </p:handoutMasterIdLst>
   <p:sldIdLst>
     <p:sldId id="270" r:id="rId3"/>
@@ -23,6 +23,7 @@
     <p:sldId id="283" r:id="rId12"/>
     <p:sldId id="285" r:id="rId13"/>
     <p:sldId id="286" r:id="rId14"/>
+    <p:sldId id="287" r:id="rId15"/>
   </p:sldIdLst>
   <p:sldSz cx="12192000" cy="6858000"/>
   <p:notesSz cx="6858000" cy="9144000"/>
@@ -225,7 +226,7 @@
           <a:p>
             <a:fld id="{65700FC0-9E7A-4C53-8A3B-3C3C9A736C42}" type="datetimeFigureOut">
               <a:rPr lang="en-US" smtClean="0"/>
-              <a:t>4/17/2017</a:t>
+              <a:t>4/19/2017</a:t>
             </a:fld>
             <a:endParaRPr lang="en-US"/>
           </a:p>
@@ -390,7 +391,7 @@
           <a:p>
             <a:fld id="{8AF122B6-E47E-4A80-A9F3-23FD10D674FE}" type="datetimeFigureOut">
               <a:rPr lang="en-US" smtClean="0"/>
-              <a:t>4/17/2017</a:t>
+              <a:t>4/19/2017</a:t>
             </a:fld>
             <a:endParaRPr lang="en-US"/>
           </a:p>
@@ -454,38 +455,37 @@
           <a:p>
             <a:pPr lvl="0"/>
             <a:r>
-              <a:rPr lang="en-US" smtClean="0"/>
+              <a:rPr lang="en-US"/>
               <a:t>Click to edit Master text styles</a:t>
             </a:r>
           </a:p>
           <a:p>
             <a:pPr lvl="1"/>
             <a:r>
-              <a:rPr lang="en-US" smtClean="0"/>
+              <a:rPr lang="en-US"/>
               <a:t>Second level</a:t>
             </a:r>
           </a:p>
           <a:p>
             <a:pPr lvl="2"/>
             <a:r>
-              <a:rPr lang="en-US" smtClean="0"/>
+              <a:rPr lang="en-US"/>
               <a:t>Third level</a:t>
             </a:r>
           </a:p>
           <a:p>
             <a:pPr lvl="3"/>
             <a:r>
-              <a:rPr lang="en-US" smtClean="0"/>
+              <a:rPr lang="en-US"/>
               <a:t>Fourth level</a:t>
             </a:r>
           </a:p>
           <a:p>
             <a:pPr lvl="4"/>
             <a:r>
-              <a:rPr lang="en-US" smtClean="0"/>
+              <a:rPr lang="en-US"/>
               <a:t>Fifth level</a:t>
             </a:r>
-            <a:endParaRPr lang="en-US"/>
           </a:p>
         </p:txBody>
       </p:sp>
@@ -701,7 +701,7 @@
             <a:fld id="{349BF3EA-1A78-4F07-BDC0-C8A1BD461199}" type="datetimeFigureOut">
               <a:rPr lang="en-US" smtClean="0"/>
               <a:pPr/>
-              <a:t>4/17/2017</a:t>
+              <a:t>4/19/2017</a:t>
             </a:fld>
             <a:endParaRPr lang="en-US"/>
           </a:p>
@@ -878,7 +878,7 @@
           </a:lstStyle>
           <a:p>
             <a:r>
-              <a:rPr lang="en-US" smtClean="0"/>
+              <a:rPr lang="en-US"/>
               <a:t>Click to edit Master subtitle style</a:t>
             </a:r>
             <a:endParaRPr lang="en-US" dirty="0"/>
@@ -915,7 +915,7 @@
           </a:lstStyle>
           <a:p>
             <a:r>
-              <a:rPr lang="en-US" smtClean="0"/>
+              <a:rPr lang="en-US"/>
               <a:t>Click to edit Master title style</a:t>
             </a:r>
             <a:endParaRPr lang="en-US" dirty="0"/>
@@ -986,7 +986,7 @@
           </a:lstStyle>
           <a:p>
             <a:r>
-              <a:rPr lang="en-US" smtClean="0"/>
+              <a:rPr lang="en-US"/>
               <a:t>Click to edit Master title style</a:t>
             </a:r>
             <a:endParaRPr lang="en-US" dirty="0"/>
@@ -1010,35 +1010,35 @@
           <a:p>
             <a:pPr lvl="0"/>
             <a:r>
-              <a:rPr lang="en-US" smtClean="0"/>
+              <a:rPr lang="en-US"/>
               <a:t>Edit Master text styles</a:t>
             </a:r>
           </a:p>
           <a:p>
             <a:pPr lvl="1"/>
             <a:r>
-              <a:rPr lang="en-US" smtClean="0"/>
+              <a:rPr lang="en-US"/>
               <a:t>Second level</a:t>
             </a:r>
           </a:p>
           <a:p>
             <a:pPr lvl="2"/>
             <a:r>
-              <a:rPr lang="en-US" smtClean="0"/>
+              <a:rPr lang="en-US"/>
               <a:t>Third level</a:t>
             </a:r>
           </a:p>
           <a:p>
             <a:pPr lvl="3"/>
             <a:r>
-              <a:rPr lang="en-US" smtClean="0"/>
+              <a:rPr lang="en-US"/>
               <a:t>Fourth level</a:t>
             </a:r>
           </a:p>
           <a:p>
             <a:pPr lvl="4"/>
             <a:r>
-              <a:rPr lang="en-US" smtClean="0"/>
+              <a:rPr lang="en-US"/>
               <a:t>Fifth level</a:t>
             </a:r>
             <a:endParaRPr lang="en-US" dirty="0"/>
@@ -1062,7 +1062,7 @@
           <a:p>
             <a:fld id="{349BF3EA-1A78-4F07-BDC0-C8A1BD461199}" type="datetimeFigureOut">
               <a:rPr lang="en-US" smtClean="0"/>
-              <a:t>4/17/2017</a:t>
+              <a:t>4/19/2017</a:t>
             </a:fld>
             <a:endParaRPr lang="en-US"/>
           </a:p>
@@ -1179,7 +1179,7 @@
           </a:lstStyle>
           <a:p>
             <a:r>
-              <a:rPr lang="en-US" smtClean="0"/>
+              <a:rPr lang="en-US"/>
               <a:t>Click to edit Master title style</a:t>
             </a:r>
             <a:endParaRPr lang="en-US" dirty="0"/>
@@ -1208,35 +1208,35 @@
           <a:p>
             <a:pPr lvl="0"/>
             <a:r>
-              <a:rPr lang="en-US" smtClean="0"/>
+              <a:rPr lang="en-US"/>
               <a:t>Edit Master text styles</a:t>
             </a:r>
           </a:p>
           <a:p>
             <a:pPr lvl="1"/>
             <a:r>
-              <a:rPr lang="en-US" smtClean="0"/>
+              <a:rPr lang="en-US"/>
               <a:t>Second level</a:t>
             </a:r>
           </a:p>
           <a:p>
             <a:pPr lvl="2"/>
             <a:r>
-              <a:rPr lang="en-US" smtClean="0"/>
+              <a:rPr lang="en-US"/>
               <a:t>Third level</a:t>
             </a:r>
           </a:p>
           <a:p>
             <a:pPr lvl="3"/>
             <a:r>
-              <a:rPr lang="en-US" smtClean="0"/>
+              <a:rPr lang="en-US"/>
               <a:t>Fourth level</a:t>
             </a:r>
           </a:p>
           <a:p>
             <a:pPr lvl="4"/>
             <a:r>
-              <a:rPr lang="en-US" smtClean="0"/>
+              <a:rPr lang="en-US"/>
               <a:t>Fifth level</a:t>
             </a:r>
             <a:endParaRPr lang="en-US" dirty="0"/>
@@ -1260,7 +1260,7 @@
           <a:p>
             <a:fld id="{349BF3EA-1A78-4F07-BDC0-C8A1BD461199}" type="datetimeFigureOut">
               <a:rPr lang="en-US" smtClean="0"/>
-              <a:t>4/17/2017</a:t>
+              <a:t>4/19/2017</a:t>
             </a:fld>
             <a:endParaRPr lang="en-US"/>
           </a:p>
@@ -1366,7 +1366,7 @@
           <a:lstStyle/>
           <a:p>
             <a:r>
-              <a:rPr lang="en-US" smtClean="0"/>
+              <a:rPr lang="en-US"/>
               <a:t>Click to edit Master title style</a:t>
             </a:r>
             <a:endParaRPr lang="en-US" dirty="0"/>
@@ -1456,38 +1456,38 @@
           <a:p>
             <a:pPr lvl="0"/>
             <a:r>
-              <a:rPr lang="en-US" smtClean="0"/>
+              <a:rPr lang="en-US"/>
               <a:t>Edit Master text styles</a:t>
             </a:r>
           </a:p>
           <a:p>
             <a:pPr lvl="1"/>
             <a:r>
-              <a:rPr lang="en-US" smtClean="0"/>
+              <a:rPr lang="en-US"/>
               <a:t>Second level</a:t>
             </a:r>
           </a:p>
           <a:p>
             <a:pPr lvl="2"/>
             <a:r>
-              <a:rPr lang="en-US" smtClean="0"/>
+              <a:rPr lang="en-US"/>
               <a:t>Third level</a:t>
             </a:r>
           </a:p>
           <a:p>
             <a:pPr lvl="3"/>
             <a:r>
-              <a:rPr lang="en-US" smtClean="0"/>
+              <a:rPr lang="en-US"/>
               <a:t>Fourth level</a:t>
             </a:r>
           </a:p>
           <a:p>
             <a:pPr lvl="4"/>
             <a:r>
-              <a:rPr lang="en-US" smtClean="0"/>
+              <a:rPr lang="en-US"/>
               <a:t>Fifth level</a:t>
             </a:r>
-            <a:endParaRPr lang="en-US" dirty="0" smtClean="0"/>
+            <a:endParaRPr lang="en-US" dirty="0"/>
           </a:p>
         </p:txBody>
       </p:sp>
@@ -1508,7 +1508,7 @@
           <a:p>
             <a:fld id="{349BF3EA-1A78-4F07-BDC0-C8A1BD461199}" type="datetimeFigureOut">
               <a:rPr lang="en-US" smtClean="0"/>
-              <a:t>4/17/2017</a:t>
+              <a:t>4/19/2017</a:t>
             </a:fld>
             <a:endParaRPr lang="en-US"/>
           </a:p>
@@ -1638,7 +1638,7 @@
           </a:lstStyle>
           <a:p>
             <a:r>
-              <a:rPr lang="en-US" smtClean="0"/>
+              <a:rPr lang="en-US"/>
               <a:t>Click to edit Master title style</a:t>
             </a:r>
             <a:endParaRPr lang="en-US" dirty="0"/>
@@ -1756,7 +1756,7 @@
           <a:p>
             <a:pPr lvl="0"/>
             <a:r>
-              <a:rPr lang="en-US" smtClean="0"/>
+              <a:rPr lang="en-US"/>
               <a:t>Edit Master text styles</a:t>
             </a:r>
           </a:p>
@@ -1779,7 +1779,7 @@
           <a:p>
             <a:fld id="{349BF3EA-1A78-4F07-BDC0-C8A1BD461199}" type="datetimeFigureOut">
               <a:rPr lang="en-US" smtClean="0"/>
-              <a:t>4/17/2017</a:t>
+              <a:t>4/19/2017</a:t>
             </a:fld>
             <a:endParaRPr lang="en-US"/>
           </a:p>
@@ -2041,7 +2041,7 @@
           </a:lstStyle>
           <a:p>
             <a:r>
-              <a:rPr lang="en-US" smtClean="0"/>
+              <a:rPr lang="en-US"/>
               <a:t>Click to edit Master title style</a:t>
             </a:r>
             <a:endParaRPr lang="en-US" dirty="0"/>
@@ -2098,38 +2098,38 @@
           <a:p>
             <a:pPr lvl="0"/>
             <a:r>
-              <a:rPr lang="en-US" smtClean="0"/>
+              <a:rPr lang="en-US"/>
               <a:t>Edit Master text styles</a:t>
             </a:r>
           </a:p>
           <a:p>
             <a:pPr lvl="1"/>
             <a:r>
-              <a:rPr lang="en-US" smtClean="0"/>
+              <a:rPr lang="en-US"/>
               <a:t>Second level</a:t>
             </a:r>
           </a:p>
           <a:p>
             <a:pPr lvl="2"/>
             <a:r>
-              <a:rPr lang="en-US" smtClean="0"/>
+              <a:rPr lang="en-US"/>
               <a:t>Third level</a:t>
             </a:r>
           </a:p>
           <a:p>
             <a:pPr lvl="3"/>
             <a:r>
-              <a:rPr lang="en-US" smtClean="0"/>
+              <a:rPr lang="en-US"/>
               <a:t>Fourth level</a:t>
             </a:r>
           </a:p>
           <a:p>
             <a:pPr lvl="4"/>
             <a:r>
-              <a:rPr lang="en-US" smtClean="0"/>
+              <a:rPr lang="en-US"/>
               <a:t>Fifth level</a:t>
             </a:r>
-            <a:endParaRPr lang="en-US" dirty="0" smtClean="0"/>
+            <a:endParaRPr lang="en-US" dirty="0"/>
           </a:p>
         </p:txBody>
       </p:sp>
@@ -2150,7 +2150,7 @@
           <a:p>
             <a:fld id="{349BF3EA-1A78-4F07-BDC0-C8A1BD461199}" type="datetimeFigureOut">
               <a:rPr lang="en-US" smtClean="0"/>
-              <a:t>4/17/2017</a:t>
+              <a:t>4/19/2017</a:t>
             </a:fld>
             <a:endParaRPr lang="en-US"/>
           </a:p>
@@ -2220,38 +2220,37 @@
           <a:p>
             <a:pPr lvl="0"/>
             <a:r>
-              <a:rPr lang="en-US" smtClean="0"/>
+              <a:rPr lang="en-US"/>
               <a:t>Edit Master text styles</a:t>
             </a:r>
           </a:p>
           <a:p>
             <a:pPr lvl="1"/>
             <a:r>
-              <a:rPr lang="en-US" smtClean="0"/>
+              <a:rPr lang="en-US"/>
               <a:t>Second level</a:t>
             </a:r>
           </a:p>
           <a:p>
             <a:pPr lvl="2"/>
             <a:r>
-              <a:rPr lang="en-US" smtClean="0"/>
+              <a:rPr lang="en-US"/>
               <a:t>Third level</a:t>
             </a:r>
           </a:p>
           <a:p>
             <a:pPr lvl="3"/>
             <a:r>
-              <a:rPr lang="en-US" smtClean="0"/>
+              <a:rPr lang="en-US"/>
               <a:t>Fourth level</a:t>
             </a:r>
           </a:p>
           <a:p>
             <a:pPr lvl="4"/>
             <a:r>
-              <a:rPr lang="en-US" smtClean="0"/>
+              <a:rPr lang="en-US"/>
               <a:t>Fifth level</a:t>
             </a:r>
-            <a:endParaRPr lang="en-US"/>
           </a:p>
         </p:txBody>
       </p:sp>
@@ -2319,7 +2318,7 @@
           </a:lstStyle>
           <a:p>
             <a:r>
-              <a:rPr lang="en-US" smtClean="0"/>
+              <a:rPr lang="en-US"/>
               <a:t>Click to edit Master title style</a:t>
             </a:r>
             <a:endParaRPr lang="en-US" dirty="0"/>
@@ -2389,7 +2388,7 @@
           <a:p>
             <a:pPr lvl="0"/>
             <a:r>
-              <a:rPr lang="en-US" smtClean="0"/>
+              <a:rPr lang="en-US"/>
               <a:t>Edit Master text styles</a:t>
             </a:r>
           </a:p>
@@ -2458,7 +2457,7 @@
           <a:p>
             <a:pPr lvl="0"/>
             <a:r>
-              <a:rPr lang="en-US" smtClean="0"/>
+              <a:rPr lang="en-US"/>
               <a:t>Edit Master text styles</a:t>
             </a:r>
           </a:p>
@@ -2481,7 +2480,7 @@
           <a:p>
             <a:fld id="{349BF3EA-1A78-4F07-BDC0-C8A1BD461199}" type="datetimeFigureOut">
               <a:rPr lang="en-US" smtClean="0"/>
-              <a:t>4/17/2017</a:t>
+              <a:t>4/19/2017</a:t>
             </a:fld>
             <a:endParaRPr lang="en-US"/>
           </a:p>
@@ -2551,35 +2550,35 @@
           <a:p>
             <a:pPr lvl="0"/>
             <a:r>
-              <a:rPr lang="en-US" smtClean="0"/>
+              <a:rPr lang="en-US"/>
               <a:t>Edit Master text styles</a:t>
             </a:r>
           </a:p>
           <a:p>
             <a:pPr lvl="1"/>
             <a:r>
-              <a:rPr lang="en-US" smtClean="0"/>
+              <a:rPr lang="en-US"/>
               <a:t>Second level</a:t>
             </a:r>
           </a:p>
           <a:p>
             <a:pPr lvl="2"/>
             <a:r>
-              <a:rPr lang="en-US" smtClean="0"/>
+              <a:rPr lang="en-US"/>
               <a:t>Third level</a:t>
             </a:r>
           </a:p>
           <a:p>
             <a:pPr lvl="3"/>
             <a:r>
-              <a:rPr lang="en-US" smtClean="0"/>
+              <a:rPr lang="en-US"/>
               <a:t>Fourth level</a:t>
             </a:r>
           </a:p>
           <a:p>
             <a:pPr lvl="4"/>
             <a:r>
-              <a:rPr lang="en-US" smtClean="0"/>
+              <a:rPr lang="en-US"/>
               <a:t>Fifth level</a:t>
             </a:r>
             <a:endParaRPr lang="en-US" dirty="0"/>
@@ -2608,35 +2607,35 @@
           <a:p>
             <a:pPr lvl="0"/>
             <a:r>
-              <a:rPr lang="en-US" smtClean="0"/>
+              <a:rPr lang="en-US"/>
               <a:t>Edit Master text styles</a:t>
             </a:r>
           </a:p>
           <a:p>
             <a:pPr lvl="1"/>
             <a:r>
-              <a:rPr lang="en-US" smtClean="0"/>
+              <a:rPr lang="en-US"/>
               <a:t>Second level</a:t>
             </a:r>
           </a:p>
           <a:p>
             <a:pPr lvl="2"/>
             <a:r>
-              <a:rPr lang="en-US" smtClean="0"/>
+              <a:rPr lang="en-US"/>
               <a:t>Third level</a:t>
             </a:r>
           </a:p>
           <a:p>
             <a:pPr lvl="3"/>
             <a:r>
-              <a:rPr lang="en-US" smtClean="0"/>
+              <a:rPr lang="en-US"/>
               <a:t>Fourth level</a:t>
             </a:r>
           </a:p>
           <a:p>
             <a:pPr lvl="4"/>
             <a:r>
-              <a:rPr lang="en-US" smtClean="0"/>
+              <a:rPr lang="en-US"/>
               <a:t>Fifth level</a:t>
             </a:r>
             <a:endParaRPr lang="en-US" dirty="0"/>
@@ -2712,7 +2711,7 @@
           </a:lstStyle>
           <a:p>
             <a:r>
-              <a:rPr lang="en-US" smtClean="0"/>
+              <a:rPr lang="en-US"/>
               <a:t>Click to edit Master title style</a:t>
             </a:r>
             <a:endParaRPr lang="en-US" dirty="0"/>
@@ -2736,7 +2735,7 @@
           <a:p>
             <a:fld id="{349BF3EA-1A78-4F07-BDC0-C8A1BD461199}" type="datetimeFigureOut">
               <a:rPr lang="en-US" smtClean="0"/>
-              <a:t>4/17/2017</a:t>
+              <a:t>4/19/2017</a:t>
             </a:fld>
             <a:endParaRPr lang="en-US"/>
           </a:p>
@@ -2843,7 +2842,7 @@
           <a:p>
             <a:fld id="{349BF3EA-1A78-4F07-BDC0-C8A1BD461199}" type="datetimeFigureOut">
               <a:rPr lang="en-US" smtClean="0"/>
-              <a:t>4/17/2017</a:t>
+              <a:t>4/19/2017</a:t>
             </a:fld>
             <a:endParaRPr lang="en-US"/>
           </a:p>
@@ -2963,7 +2962,7 @@
           </a:lstStyle>
           <a:p>
             <a:r>
-              <a:rPr lang="en-US" smtClean="0"/>
+              <a:rPr lang="en-US"/>
               <a:t>Click to edit Master title style</a:t>
             </a:r>
             <a:endParaRPr lang="en-US" dirty="0"/>
@@ -3020,35 +3019,35 @@
           <a:p>
             <a:pPr lvl="0"/>
             <a:r>
-              <a:rPr lang="en-US" smtClean="0"/>
+              <a:rPr lang="en-US"/>
               <a:t>Edit Master text styles</a:t>
             </a:r>
           </a:p>
           <a:p>
             <a:pPr lvl="1"/>
             <a:r>
-              <a:rPr lang="en-US" smtClean="0"/>
+              <a:rPr lang="en-US"/>
               <a:t>Second level</a:t>
             </a:r>
           </a:p>
           <a:p>
             <a:pPr lvl="2"/>
             <a:r>
-              <a:rPr lang="en-US" smtClean="0"/>
+              <a:rPr lang="en-US"/>
               <a:t>Third level</a:t>
             </a:r>
           </a:p>
           <a:p>
             <a:pPr lvl="3"/>
             <a:r>
-              <a:rPr lang="en-US" smtClean="0"/>
+              <a:rPr lang="en-US"/>
               <a:t>Fourth level</a:t>
             </a:r>
           </a:p>
           <a:p>
             <a:pPr lvl="4"/>
             <a:r>
-              <a:rPr lang="en-US" smtClean="0"/>
+              <a:rPr lang="en-US"/>
               <a:t>Fifth level</a:t>
             </a:r>
             <a:endParaRPr lang="en-US" dirty="0"/>
@@ -3119,7 +3118,7 @@
           <a:p>
             <a:pPr lvl="0"/>
             <a:r>
-              <a:rPr lang="en-US" smtClean="0"/>
+              <a:rPr lang="en-US"/>
               <a:t>Edit Master text styles</a:t>
             </a:r>
           </a:p>
@@ -3142,7 +3141,7 @@
           <a:p>
             <a:fld id="{349BF3EA-1A78-4F07-BDC0-C8A1BD461199}" type="datetimeFigureOut">
               <a:rPr lang="en-US" smtClean="0"/>
-              <a:t>4/17/2017</a:t>
+              <a:t>4/19/2017</a:t>
             </a:fld>
             <a:endParaRPr lang="en-US"/>
           </a:p>
@@ -3262,7 +3261,7 @@
           </a:lstStyle>
           <a:p>
             <a:r>
-              <a:rPr lang="en-US" smtClean="0"/>
+              <a:rPr lang="en-US"/>
               <a:t>Click to edit Master title style</a:t>
             </a:r>
             <a:endParaRPr lang="en-US" dirty="0"/>
@@ -3339,7 +3338,7 @@
           </a:lstStyle>
           <a:p>
             <a:r>
-              <a:rPr lang="en-US" smtClean="0"/>
+              <a:rPr lang="en-US"/>
               <a:t>Click icon to add picture</a:t>
             </a:r>
             <a:endParaRPr lang="en-US" dirty="0"/>
@@ -3407,7 +3406,7 @@
           <a:p>
             <a:pPr lvl="0"/>
             <a:r>
-              <a:rPr lang="en-US" smtClean="0"/>
+              <a:rPr lang="en-US"/>
               <a:t>Edit Master text styles</a:t>
             </a:r>
           </a:p>
@@ -3430,7 +3429,7 @@
           <a:p>
             <a:fld id="{349BF3EA-1A78-4F07-BDC0-C8A1BD461199}" type="datetimeFigureOut">
               <a:rPr lang="en-US" smtClean="0"/>
-              <a:t>4/17/2017</a:t>
+              <a:t>4/19/2017</a:t>
             </a:fld>
             <a:endParaRPr lang="en-US"/>
           </a:p>
@@ -3560,7 +3559,7 @@
             <a:fld id="{349BF3EA-1A78-4F07-BDC0-C8A1BD461199}" type="datetimeFigureOut">
               <a:rPr lang="en-US" smtClean="0"/>
               <a:pPr/>
-              <a:t>4/17/2017</a:t>
+              <a:t>4/19/2017</a:t>
             </a:fld>
             <a:endParaRPr lang="en-US"/>
           </a:p>
@@ -3787,38 +3786,38 @@
           <a:p>
             <a:pPr lvl="0"/>
             <a:r>
-              <a:rPr lang="en-US" smtClean="0"/>
+              <a:rPr lang="en-US"/>
               <a:t>Edit Master text styles</a:t>
             </a:r>
           </a:p>
           <a:p>
             <a:pPr lvl="1"/>
             <a:r>
-              <a:rPr lang="en-US" smtClean="0"/>
+              <a:rPr lang="en-US"/>
               <a:t>Second level</a:t>
             </a:r>
           </a:p>
           <a:p>
             <a:pPr lvl="2"/>
             <a:r>
-              <a:rPr lang="en-US" smtClean="0"/>
+              <a:rPr lang="en-US"/>
               <a:t>Third level</a:t>
             </a:r>
           </a:p>
           <a:p>
             <a:pPr lvl="3"/>
             <a:r>
-              <a:rPr lang="en-US" smtClean="0"/>
+              <a:rPr lang="en-US"/>
               <a:t>Fourth level</a:t>
             </a:r>
           </a:p>
           <a:p>
             <a:pPr lvl="4"/>
             <a:r>
-              <a:rPr lang="en-US" smtClean="0"/>
+              <a:rPr lang="en-US"/>
               <a:t>Fifth level</a:t>
             </a:r>
-            <a:endParaRPr lang="en-US" dirty="0" smtClean="0"/>
+            <a:endParaRPr lang="en-US" dirty="0"/>
           </a:p>
         </p:txBody>
       </p:sp>
@@ -3848,7 +3847,7 @@
           <a:lstStyle/>
           <a:p>
             <a:r>
-              <a:rPr lang="en-US" smtClean="0"/>
+              <a:rPr lang="en-US"/>
               <a:t>Click to edit Master title style</a:t>
             </a:r>
             <a:endParaRPr lang="en-US" dirty="0"/>
@@ -3888,13 +3887,6 @@
       </p:transition>
     </mc:Fallback>
   </mc:AlternateContent>
-  <p:timing>
-    <p:tnLst>
-      <p:par>
-        <p:cTn id="1" dur="indefinite" restart="never" nodeType="tmRoot"/>
-      </p:par>
-    </p:tnLst>
-  </p:timing>
   <p:txStyles>
     <p:titleStyle>
       <a:lvl1pPr algn="ctr" defTabSz="914400" rtl="0" eaLnBrk="1" latinLnBrk="0" hangingPunct="1">
@@ -4185,10 +4177,9 @@
           <a:lstStyle/>
           <a:p>
             <a:r>
-              <a:rPr lang="en-US" dirty="0" smtClean="0"/>
+              <a:rPr lang="en-US" dirty="0"/>
               <a:t>Presented by Code Monkey</a:t>
             </a:r>
-            <a:endParaRPr lang="en-US" dirty="0"/>
           </a:p>
         </p:txBody>
       </p:sp>
@@ -4208,14 +4199,13 @@
           <a:lstStyle/>
           <a:p>
             <a:r>
-              <a:rPr lang="en-US" dirty="0" err="1" smtClean="0"/>
+              <a:rPr lang="en-US" dirty="0" err="1"/>
               <a:t>D.Eco</a:t>
             </a:r>
             <a:r>
-              <a:rPr lang="en-US" dirty="0" smtClean="0"/>
+              <a:rPr lang="en-US" dirty="0"/>
               <a:t> Application</a:t>
             </a:r>
-            <a:endParaRPr lang="en-US" dirty="0"/>
           </a:p>
         </p:txBody>
       </p:sp>
@@ -4271,13 +4261,6 @@
       </p:transition>
     </mc:Fallback>
   </mc:AlternateContent>
-  <p:timing>
-    <p:tnLst>
-      <p:par>
-        <p:cTn id="1" dur="indefinite" restart="never" nodeType="tmRoot"/>
-      </p:par>
-    </p:tnLst>
-  </p:timing>
 </p:sld>
 </file>
 
@@ -4314,10 +4297,9 @@
           <a:lstStyle/>
           <a:p>
             <a:r>
-              <a:rPr lang="en-US" dirty="0" smtClean="0"/>
+              <a:rPr lang="en-US" dirty="0"/>
               <a:t>Initial Architecture</a:t>
             </a:r>
-            <a:endParaRPr lang="en-US" dirty="0"/>
           </a:p>
         </p:txBody>
       </p:sp>
@@ -4353,7 +4335,7 @@
           <a:noFill/>
           <a:extLst>
             <a:ext uri="{909E8E84-426E-40dd-AFC4-6F175D3DCCD1}">
-              <a14:hiddenFill xmlns:a14="http://schemas.microsoft.com/office/drawing/2010/main" xmlns="">
+              <a14:hiddenFill xmlns="" xmlns:a14="http://schemas.microsoft.com/office/drawing/2010/main">
                 <a:solidFill>
                   <a:srgbClr val="FFFFFF"/>
                 </a:solidFill>
@@ -4415,10 +4397,9 @@
           <a:lstStyle/>
           <a:p>
             <a:r>
-              <a:rPr lang="en-US" dirty="0" smtClean="0"/>
+              <a:rPr lang="en-US" dirty="0"/>
               <a:t>Code Monkey</a:t>
             </a:r>
-            <a:endParaRPr lang="en-US" dirty="0"/>
           </a:p>
         </p:txBody>
       </p:sp>
@@ -4445,10 +4426,9 @@
           <a:lstStyle/>
           <a:p>
             <a:r>
-              <a:rPr lang="en-US" dirty="0" smtClean="0"/>
+              <a:rPr lang="en-US" dirty="0"/>
               <a:t>April 5, 2017</a:t>
             </a:r>
-            <a:endParaRPr lang="en-US" dirty="0"/>
           </a:p>
         </p:txBody>
       </p:sp>
@@ -4474,13 +4454,6 @@
       </p:transition>
     </mc:Fallback>
   </mc:AlternateContent>
-  <p:timing>
-    <p:tnLst>
-      <p:par>
-        <p:cTn id="1" dur="indefinite" restart="never" nodeType="tmRoot"/>
-      </p:par>
-    </p:tnLst>
-  </p:timing>
 </p:sld>
 </file>
 
@@ -4517,10 +4490,9 @@
           <a:lstStyle/>
           <a:p>
             <a:r>
-              <a:rPr lang="en-US" dirty="0" smtClean="0"/>
+              <a:rPr lang="en-US" dirty="0"/>
               <a:t>Security Risk</a:t>
             </a:r>
-            <a:endParaRPr lang="en-US" dirty="0"/>
           </a:p>
         </p:txBody>
       </p:sp>
@@ -4540,35 +4512,27 @@
           <a:lstStyle/>
           <a:p>
             <a:r>
-              <a:rPr lang="en-US" dirty="0" smtClean="0"/>
+              <a:rPr lang="en-US" dirty="0"/>
               <a:t>Penetration Attacks</a:t>
             </a:r>
           </a:p>
           <a:p>
             <a:pPr lvl="1"/>
             <a:r>
-              <a:rPr lang="en-US" dirty="0" smtClean="0"/>
+              <a:rPr lang="en-US" dirty="0"/>
               <a:t>Denial of service</a:t>
             </a:r>
           </a:p>
           <a:p>
             <a:r>
-              <a:rPr lang="en-US" dirty="0" smtClean="0"/>
+              <a:rPr lang="en-US" dirty="0"/>
               <a:t>MITM Attack</a:t>
             </a:r>
           </a:p>
           <a:p>
             <a:r>
-              <a:rPr lang="en-US" dirty="0" smtClean="0"/>
-              <a:t>SQL </a:t>
-            </a:r>
-            <a:r>
               <a:rPr lang="en-US" dirty="0"/>
-              <a:t>I</a:t>
-            </a:r>
-            <a:r>
-              <a:rPr lang="en-US" dirty="0" smtClean="0"/>
-              <a:t>njection</a:t>
+              <a:t>SQL Injection</a:t>
             </a:r>
           </a:p>
         </p:txBody>
@@ -4596,10 +4560,9 @@
           <a:lstStyle/>
           <a:p>
             <a:r>
-              <a:rPr lang="en-US" dirty="0" smtClean="0"/>
+              <a:rPr lang="en-US" dirty="0"/>
               <a:t>Code Monkey</a:t>
             </a:r>
-            <a:endParaRPr lang="en-US" dirty="0"/>
           </a:p>
         </p:txBody>
       </p:sp>
@@ -4626,10 +4589,9 @@
           <a:lstStyle/>
           <a:p>
             <a:r>
-              <a:rPr lang="en-US" dirty="0" smtClean="0"/>
+              <a:rPr lang="en-US" dirty="0"/>
               <a:t>April 5, 2017</a:t>
             </a:r>
-            <a:endParaRPr lang="en-US" dirty="0"/>
           </a:p>
         </p:txBody>
       </p:sp>
@@ -4721,10 +4683,9 @@
           <a:lstStyle/>
           <a:p>
             <a:r>
-              <a:rPr lang="en-US" dirty="0" smtClean="0"/>
+              <a:rPr lang="en-US" dirty="0"/>
               <a:t>Plan – Sprint 1 Elaboration</a:t>
             </a:r>
-            <a:endParaRPr lang="en-US" dirty="0"/>
           </a:p>
         </p:txBody>
       </p:sp>
@@ -4738,7 +4699,7 @@
             <p:ph idx="1"/>
             <p:extLst>
               <p:ext uri="{D42A27DB-BD31-4B8C-83A1-F6EECF244321}">
-                <p14:modId xmlns:p14="http://schemas.microsoft.com/office/powerpoint/2010/main" val="2845048708"/>
+                <p14:modId xmlns:p14="http://schemas.microsoft.com/office/powerpoint/2010/main" val="3009235010"/>
               </p:ext>
             </p:extLst>
           </p:nvPr>
@@ -4754,14 +4715,14 @@
                 <a:tableStyleId>{5C22544A-7EE6-4342-B048-85BDC9FD1C3A}</a:tableStyleId>
               </a:tblPr>
               <a:tblGrid>
-                <a:gridCol w="3657600">
+                <a:gridCol w="4038600">
                   <a:extLst>
                     <a:ext uri="{9D8B030D-6E8A-4147-A177-3AD203B41FA5}">
                       <a16:colId xmlns:a16="http://schemas.microsoft.com/office/drawing/2014/main" val="20000"/>
                     </a:ext>
                   </a:extLst>
                 </a:gridCol>
-                <a:gridCol w="3657600">
+                <a:gridCol w="3276600">
                   <a:extLst>
                     <a:ext uri="{9D8B030D-6E8A-4147-A177-3AD203B41FA5}">
                       <a16:colId xmlns:a16="http://schemas.microsoft.com/office/drawing/2014/main" val="20001"/>
@@ -4783,10 +4744,9 @@
                     <a:lstStyle/>
                     <a:p>
                       <a:r>
-                        <a:rPr lang="en-US" dirty="0" smtClean="0"/>
+                        <a:rPr lang="en-US" dirty="0"/>
                         <a:t>What</a:t>
                       </a:r>
-                      <a:endParaRPr lang="en-US" dirty="0"/>
                     </a:p>
                   </a:txBody>
                   <a:tcPr/>
@@ -4797,10 +4757,9 @@
                     <a:lstStyle/>
                     <a:p>
                       <a:r>
-                        <a:rPr lang="en-US" dirty="0" smtClean="0"/>
+                        <a:rPr lang="en-US" dirty="0"/>
                         <a:t>Who</a:t>
                       </a:r>
-                      <a:endParaRPr lang="en-US" dirty="0"/>
                     </a:p>
                   </a:txBody>
                   <a:tcPr/>
@@ -4811,10 +4770,9 @@
                     <a:lstStyle/>
                     <a:p>
                       <a:r>
-                        <a:rPr lang="en-US" dirty="0" smtClean="0"/>
+                        <a:rPr lang="en-US" dirty="0"/>
                         <a:t>When</a:t>
                       </a:r>
-                      <a:endParaRPr lang="en-US" dirty="0"/>
                     </a:p>
                   </a:txBody>
                   <a:tcPr/>
@@ -4832,8 +4790,21 @@
                     <a:lstStyle/>
                     <a:p>
                       <a:r>
-                        <a:rPr lang="en-US" dirty="0" smtClean="0"/>
-                        <a:t>--</a:t>
+                        <a:rPr lang="en-US" dirty="0"/>
+                        <a:t>Update communication diagram</a:t>
+                      </a:r>
+                    </a:p>
+                  </a:txBody>
+                  <a:tcPr/>
+                </a:tc>
+                <a:tc>
+                  <a:txBody>
+                    <a:bodyPr/>
+                    <a:lstStyle/>
+                    <a:p>
+                      <a:r>
+                        <a:rPr lang="en-US" dirty="0" err="1"/>
+                        <a:t>Fiasal</a:t>
                       </a:r>
                       <a:endParaRPr lang="en-US" dirty="0"/>
                     </a:p>
@@ -4846,24 +4817,9 @@
                     <a:lstStyle/>
                     <a:p>
                       <a:r>
-                        <a:rPr lang="en-US" dirty="0" smtClean="0"/>
-                        <a:t>--</a:t>
+                        <a:rPr lang="en-US" dirty="0"/>
+                        <a:t>4/26/17</a:t>
                       </a:r>
-                      <a:endParaRPr lang="en-US" dirty="0"/>
-                    </a:p>
-                  </a:txBody>
-                  <a:tcPr/>
-                </a:tc>
-                <a:tc>
-                  <a:txBody>
-                    <a:bodyPr/>
-                    <a:lstStyle/>
-                    <a:p>
-                      <a:r>
-                        <a:rPr lang="en-US" dirty="0" smtClean="0"/>
-                        <a:t>--</a:t>
-                      </a:r>
-                      <a:endParaRPr lang="en-US" dirty="0"/>
                     </a:p>
                   </a:txBody>
                   <a:tcPr/>
@@ -4881,10 +4837,9 @@
                     <a:lstStyle/>
                     <a:p>
                       <a:r>
-                        <a:rPr lang="en-US" dirty="0" smtClean="0"/>
-                        <a:t>--</a:t>
+                        <a:rPr lang="en-US" dirty="0"/>
+                        <a:t>Create elaboration class diagram</a:t>
                       </a:r>
-                      <a:endParaRPr lang="en-US" dirty="0"/>
                     </a:p>
                   </a:txBody>
                   <a:tcPr/>
@@ -4895,10 +4850,9 @@
                     <a:lstStyle/>
                     <a:p>
                       <a:r>
-                        <a:rPr lang="en-US" dirty="0" smtClean="0"/>
-                        <a:t>--</a:t>
+                        <a:rPr lang="en-US" dirty="0"/>
+                        <a:t>Cory</a:t>
                       </a:r>
-                      <a:endParaRPr lang="en-US" dirty="0"/>
                     </a:p>
                   </a:txBody>
                   <a:tcPr/>
@@ -4909,10 +4863,9 @@
                     <a:lstStyle/>
                     <a:p>
                       <a:r>
-                        <a:rPr lang="en-US" dirty="0" smtClean="0"/>
-                        <a:t>--</a:t>
+                        <a:rPr lang="en-US" dirty="0"/>
+                        <a:t>4/26/17</a:t>
                       </a:r>
-                      <a:endParaRPr lang="en-US" dirty="0"/>
                     </a:p>
                   </a:txBody>
                   <a:tcPr/>
@@ -4930,10 +4883,9 @@
                     <a:lstStyle/>
                     <a:p>
                       <a:r>
-                        <a:rPr lang="en-US" smtClean="0"/>
-                        <a:t>--</a:t>
+                        <a:rPr lang="en-US" dirty="0"/>
+                        <a:t>Update architecture in Elaboration</a:t>
                       </a:r>
-                      <a:endParaRPr lang="en-US" dirty="0"/>
                     </a:p>
                   </a:txBody>
                   <a:tcPr/>
@@ -4944,10 +4896,9 @@
                     <a:lstStyle/>
                     <a:p>
                       <a:r>
-                        <a:rPr lang="en-US" dirty="0" smtClean="0"/>
-                        <a:t>--</a:t>
+                        <a:rPr lang="en-US" dirty="0"/>
+                        <a:t>Kylie</a:t>
                       </a:r>
-                      <a:endParaRPr lang="en-US" dirty="0"/>
                     </a:p>
                   </a:txBody>
                   <a:tcPr/>
@@ -4958,10 +4909,9 @@
                     <a:lstStyle/>
                     <a:p>
                       <a:r>
-                        <a:rPr lang="en-US" dirty="0" smtClean="0"/>
-                        <a:t>--</a:t>
+                        <a:rPr lang="en-US" dirty="0"/>
+                        <a:t>4/26/17</a:t>
                       </a:r>
-                      <a:endParaRPr lang="en-US" dirty="0"/>
                     </a:p>
                   </a:txBody>
                   <a:tcPr/>
@@ -4999,10 +4949,9 @@
           <a:lstStyle/>
           <a:p>
             <a:r>
-              <a:rPr lang="en-US" dirty="0" smtClean="0"/>
+              <a:rPr lang="en-US" dirty="0"/>
               <a:t>Code Monkey</a:t>
             </a:r>
-            <a:endParaRPr lang="en-US" dirty="0"/>
           </a:p>
         </p:txBody>
       </p:sp>
@@ -5029,10 +4978,9 @@
           <a:lstStyle/>
           <a:p>
             <a:r>
-              <a:rPr lang="en-US" dirty="0" smtClean="0"/>
+              <a:rPr lang="en-US" dirty="0"/>
               <a:t>April 5, 2017</a:t>
             </a:r>
-            <a:endParaRPr lang="en-US" dirty="0"/>
           </a:p>
         </p:txBody>
       </p:sp>
@@ -5091,6 +5039,130 @@
 </p:sld>
 </file>
 
+<file path=ppt/slides/slide13.xml><?xml version="1.0" encoding="utf-8"?>
+<p:sld xmlns:a="http://schemas.openxmlformats.org/drawingml/2006/main" xmlns:r="http://schemas.openxmlformats.org/officeDocument/2006/relationships" xmlns:p="http://schemas.openxmlformats.org/presentationml/2006/main">
+  <p:cSld>
+    <p:spTree>
+      <p:nvGrpSpPr>
+        <p:cNvPr id="1" name=""/>
+        <p:cNvGrpSpPr/>
+        <p:nvPr/>
+      </p:nvGrpSpPr>
+      <p:grpSpPr>
+        <a:xfrm>
+          <a:off x="0" y="0"/>
+          <a:ext cx="0" cy="0"/>
+          <a:chOff x="0" y="0"/>
+          <a:chExt cx="0" cy="0"/>
+        </a:xfrm>
+      </p:grpSpPr>
+      <p:sp>
+        <p:nvSpPr>
+          <p:cNvPr id="2" name="Title 1"/>
+          <p:cNvSpPr>
+            <a:spLocks noGrp="1"/>
+          </p:cNvSpPr>
+          <p:nvPr>
+            <p:ph type="title"/>
+          </p:nvPr>
+        </p:nvSpPr>
+        <p:spPr/>
+        <p:txBody>
+          <a:bodyPr/>
+          <a:lstStyle/>
+          <a:p>
+            <a:r>
+              <a:rPr lang="en-US" dirty="0"/>
+              <a:t>Elaborating on the Elaboration Plan</a:t>
+            </a:r>
+          </a:p>
+        </p:txBody>
+      </p:sp>
+      <p:sp>
+        <p:nvSpPr>
+          <p:cNvPr id="3" name="Content Placeholder 2"/>
+          <p:cNvSpPr>
+            <a:spLocks noGrp="1"/>
+          </p:cNvSpPr>
+          <p:nvPr>
+            <p:ph idx="1"/>
+          </p:nvPr>
+        </p:nvSpPr>
+        <p:spPr/>
+        <p:txBody>
+          <a:bodyPr/>
+          <a:lstStyle/>
+          <a:p>
+            <a:r>
+              <a:rPr lang="en-US" dirty="0"/>
+              <a:t>Elaboration Architecture:</a:t>
+            </a:r>
+          </a:p>
+          <a:p>
+            <a:pPr lvl="1"/>
+            <a:r>
+              <a:rPr lang="en-US" dirty="0"/>
+              <a:t>During elaboration, we will update the initial architecture to have a better documented architecture.</a:t>
+            </a:r>
+          </a:p>
+          <a:p>
+            <a:r>
+              <a:rPr lang="en-US" dirty="0"/>
+              <a:t>Create elaboration class diagram:</a:t>
+            </a:r>
+          </a:p>
+          <a:p>
+            <a:pPr lvl="1"/>
+            <a:r>
+              <a:rPr lang="en-US" dirty="0"/>
+              <a:t>Work alongside teammates to create an accurate elaboration class diagram.</a:t>
+            </a:r>
+          </a:p>
+          <a:p>
+            <a:r>
+              <a:rPr lang="en-US" dirty="0"/>
+              <a:t>Updating the communication diagram:</a:t>
+            </a:r>
+          </a:p>
+          <a:p>
+            <a:pPr lvl="1"/>
+            <a:r>
+              <a:rPr lang="en-US" dirty="0"/>
+              <a:t>Ensuring all communication is documented properly within </a:t>
+            </a:r>
+            <a:r>
+              <a:rPr lang="en-US"/>
+              <a:t>the diagram.</a:t>
+            </a:r>
+            <a:endParaRPr lang="en-US" dirty="0"/>
+          </a:p>
+        </p:txBody>
+      </p:sp>
+    </p:spTree>
+    <p:extLst>
+      <p:ext uri="{BB962C8B-B14F-4D97-AF65-F5344CB8AC3E}">
+        <p14:creationId xmlns:p14="http://schemas.microsoft.com/office/powerpoint/2010/main" val="2472491561"/>
+      </p:ext>
+    </p:extLst>
+  </p:cSld>
+  <p:clrMapOvr>
+    <a:masterClrMapping/>
+  </p:clrMapOvr>
+  <mc:AlternateContent xmlns:mc="http://schemas.openxmlformats.org/markup-compatibility/2006" xmlns:p14="http://schemas.microsoft.com/office/powerpoint/2010/main">
+    <mc:Choice Requires="p14">
+      <p:transition spd="med" p14:dur="700">
+        <p:fade/>
+      </p:transition>
+    </mc:Choice>
+    <mc:Fallback xmlns="">
+      <p:transition spd="med">
+        <p:fade/>
+      </p:transition>
+    </mc:Fallback>
+  </mc:AlternateContent>
+</p:sld>
+</file>
+
 <file path=ppt/slides/slide2.xml><?xml version="1.0" encoding="utf-8"?>
 <p:sld xmlns:a="http://schemas.openxmlformats.org/drawingml/2006/main" xmlns:r="http://schemas.openxmlformats.org/officeDocument/2006/relationships" xmlns:p="http://schemas.openxmlformats.org/presentationml/2006/main">
   <p:cSld>
@@ -5124,10 +5196,9 @@
           <a:lstStyle/>
           <a:p>
             <a:r>
-              <a:rPr lang="en-US" dirty="0" smtClean="0"/>
+              <a:rPr lang="en-US" dirty="0"/>
               <a:t>Sprint 1 Inception</a:t>
             </a:r>
-            <a:endParaRPr lang="en-US" dirty="0"/>
           </a:p>
         </p:txBody>
       </p:sp>
@@ -5147,34 +5218,33 @@
           <a:lstStyle/>
           <a:p>
             <a:r>
-              <a:rPr lang="en-US" dirty="0" smtClean="0"/>
+              <a:rPr lang="en-US" dirty="0"/>
               <a:t>Use Case Model</a:t>
             </a:r>
           </a:p>
           <a:p>
             <a:r>
-              <a:rPr lang="en-US" dirty="0" smtClean="0"/>
+              <a:rPr lang="en-US" dirty="0"/>
               <a:t>Risk Analysis</a:t>
             </a:r>
           </a:p>
           <a:p>
             <a:r>
-              <a:rPr lang="en-US" dirty="0" smtClean="0"/>
+              <a:rPr lang="en-US" dirty="0"/>
               <a:t>Technology Plan</a:t>
             </a:r>
           </a:p>
           <a:p>
             <a:r>
-              <a:rPr lang="en-US" dirty="0" smtClean="0"/>
+              <a:rPr lang="en-US" dirty="0"/>
               <a:t>Effort Estimate</a:t>
             </a:r>
           </a:p>
           <a:p>
             <a:r>
-              <a:rPr lang="en-US" dirty="0" smtClean="0"/>
+              <a:rPr lang="en-US" dirty="0"/>
               <a:t>System Architecture</a:t>
             </a:r>
-            <a:endParaRPr lang="en-US" dirty="0"/>
           </a:p>
         </p:txBody>
       </p:sp>
@@ -5261,10 +5331,9 @@
           <a:lstStyle/>
           <a:p>
             <a:r>
-              <a:rPr lang="en-US" dirty="0" smtClean="0"/>
+              <a:rPr lang="en-US" dirty="0"/>
               <a:t>Code Monkey</a:t>
             </a:r>
-            <a:endParaRPr lang="en-US" dirty="0"/>
           </a:p>
         </p:txBody>
       </p:sp>
@@ -5291,10 +5360,9 @@
           <a:lstStyle/>
           <a:p>
             <a:r>
-              <a:rPr lang="en-US" dirty="0" smtClean="0"/>
+              <a:rPr lang="en-US" dirty="0"/>
               <a:t>April 5, 2017</a:t>
             </a:r>
-            <a:endParaRPr lang="en-US" dirty="0"/>
           </a:p>
         </p:txBody>
       </p:sp>
@@ -5320,13 +5388,6 @@
       </p:transition>
     </mc:Fallback>
   </mc:AlternateContent>
-  <p:timing>
-    <p:tnLst>
-      <p:par>
-        <p:cTn id="1" dur="indefinite" restart="never" nodeType="tmRoot"/>
-      </p:par>
-    </p:tnLst>
-  </p:timing>
 </p:sld>
 </file>
 
@@ -5368,10 +5429,9 @@
           <a:lstStyle/>
           <a:p>
             <a:r>
-              <a:rPr lang="en-US" dirty="0" smtClean="0"/>
+              <a:rPr lang="en-US" dirty="0"/>
               <a:t>Use Case Model</a:t>
             </a:r>
-            <a:endParaRPr lang="en-US" dirty="0"/>
           </a:p>
         </p:txBody>
       </p:sp>
@@ -5428,10 +5488,9 @@
           <a:lstStyle/>
           <a:p>
             <a:r>
-              <a:rPr lang="en-US" dirty="0" smtClean="0"/>
+              <a:rPr lang="en-US" dirty="0"/>
               <a:t>Code Monkey</a:t>
             </a:r>
-            <a:endParaRPr lang="en-US" dirty="0"/>
           </a:p>
         </p:txBody>
       </p:sp>
@@ -5458,10 +5517,9 @@
           <a:lstStyle/>
           <a:p>
             <a:r>
-              <a:rPr lang="en-US" dirty="0" smtClean="0"/>
+              <a:rPr lang="en-US" dirty="0"/>
               <a:t>April 5, 2017</a:t>
             </a:r>
-            <a:endParaRPr lang="en-US" dirty="0"/>
           </a:p>
         </p:txBody>
       </p:sp>
@@ -5517,13 +5575,6 @@
       </p:transition>
     </mc:Fallback>
   </mc:AlternateContent>
-  <p:timing>
-    <p:tnLst>
-      <p:par>
-        <p:cTn id="1" dur="indefinite" restart="never" nodeType="tmRoot"/>
-      </p:par>
-    </p:tnLst>
-  </p:timing>
 </p:sld>
 </file>
 
@@ -5560,10 +5611,9 @@
           <a:lstStyle/>
           <a:p>
             <a:r>
-              <a:rPr lang="en-US" dirty="0" smtClean="0"/>
+              <a:rPr lang="en-US" dirty="0"/>
               <a:t>Technology Plan</a:t>
             </a:r>
-            <a:endParaRPr lang="en-US" dirty="0"/>
           </a:p>
         </p:txBody>
       </p:sp>
@@ -5615,10 +5665,9 @@
                     <a:lstStyle/>
                     <a:p>
                       <a:r>
-                        <a:rPr lang="en-US" dirty="0" smtClean="0"/>
+                        <a:rPr lang="en-US" dirty="0"/>
                         <a:t>Technology</a:t>
                       </a:r>
-                      <a:endParaRPr lang="en-US" dirty="0"/>
                     </a:p>
                   </a:txBody>
                   <a:tcPr/>
@@ -5629,10 +5678,9 @@
                     <a:lstStyle/>
                     <a:p>
                       <a:r>
-                        <a:rPr lang="en-US" dirty="0" smtClean="0"/>
+                        <a:rPr lang="en-US" dirty="0"/>
                         <a:t>Experience Rating</a:t>
                       </a:r>
-                      <a:endParaRPr lang="en-US" dirty="0"/>
                     </a:p>
                   </a:txBody>
                   <a:tcPr/>
@@ -5650,10 +5698,9 @@
                     <a:lstStyle/>
                     <a:p>
                       <a:r>
-                        <a:rPr lang="en-US" dirty="0" smtClean="0"/>
+                        <a:rPr lang="en-US" dirty="0"/>
                         <a:t>Phone App Technologies</a:t>
                       </a:r>
-                      <a:endParaRPr lang="en-US" dirty="0"/>
                     </a:p>
                   </a:txBody>
                   <a:tcPr/>
@@ -5681,10 +5728,9 @@
                     <a:lstStyle/>
                     <a:p>
                       <a:r>
-                        <a:rPr lang="en-US" dirty="0" smtClean="0"/>
+                        <a:rPr lang="en-US" dirty="0"/>
                         <a:t>IOS</a:t>
                       </a:r>
-                      <a:endParaRPr lang="en-US" dirty="0"/>
                     </a:p>
                   </a:txBody>
                   <a:tcPr/>
@@ -5695,10 +5741,9 @@
                     <a:lstStyle/>
                     <a:p>
                       <a:r>
-                        <a:rPr lang="en-US" dirty="0" smtClean="0"/>
+                        <a:rPr lang="en-US" dirty="0"/>
                         <a:t>Tutorial</a:t>
                       </a:r>
-                      <a:endParaRPr lang="en-US" dirty="0"/>
                     </a:p>
                   </a:txBody>
                   <a:tcPr/>
@@ -5716,10 +5761,9 @@
                     <a:lstStyle/>
                     <a:p>
                       <a:r>
-                        <a:rPr lang="en-US" dirty="0" smtClean="0"/>
+                        <a:rPr lang="en-US" dirty="0"/>
                         <a:t>Android</a:t>
                       </a:r>
-                      <a:endParaRPr lang="en-US" dirty="0"/>
                     </a:p>
                   </a:txBody>
                   <a:tcPr/>
@@ -5730,10 +5774,9 @@
                     <a:lstStyle/>
                     <a:p>
                       <a:r>
-                        <a:rPr lang="en-US" dirty="0" smtClean="0"/>
+                        <a:rPr lang="en-US" dirty="0"/>
                         <a:t>None</a:t>
                       </a:r>
-                      <a:endParaRPr lang="en-US" dirty="0"/>
                     </a:p>
                   </a:txBody>
                   <a:tcPr/>
@@ -5751,11 +5794,11 @@
                     <a:lstStyle/>
                     <a:p>
                       <a:r>
-                        <a:rPr lang="en-US" dirty="0" smtClean="0"/>
+                        <a:rPr lang="en-US" dirty="0"/>
                         <a:t>Map</a:t>
                       </a:r>
                       <a:r>
-                        <a:rPr lang="en-US" baseline="0" dirty="0" smtClean="0"/>
+                        <a:rPr lang="en-US" baseline="0" dirty="0"/>
                         <a:t> Technologies</a:t>
                       </a:r>
                       <a:endParaRPr lang="en-US" dirty="0"/>
@@ -5786,10 +5829,9 @@
                     <a:lstStyle/>
                     <a:p>
                       <a:r>
-                        <a:rPr lang="en-US" dirty="0" smtClean="0"/>
+                        <a:rPr lang="en-US" dirty="0"/>
                         <a:t>Google Maps</a:t>
                       </a:r>
-                      <a:endParaRPr lang="en-US" dirty="0"/>
                     </a:p>
                   </a:txBody>
                   <a:tcPr/>
@@ -5800,10 +5842,9 @@
                     <a:lstStyle/>
                     <a:p>
                       <a:r>
-                        <a:rPr lang="en-US" dirty="0" smtClean="0"/>
+                        <a:rPr lang="en-US" dirty="0"/>
                         <a:t>Tutorial</a:t>
                       </a:r>
-                      <a:endParaRPr lang="en-US" dirty="0"/>
                     </a:p>
                   </a:txBody>
                   <a:tcPr/>
@@ -5821,10 +5862,9 @@
                     <a:lstStyle/>
                     <a:p>
                       <a:r>
-                        <a:rPr lang="en-US" dirty="0" smtClean="0"/>
+                        <a:rPr lang="en-US" dirty="0"/>
                         <a:t>Open Layers</a:t>
                       </a:r>
-                      <a:endParaRPr lang="en-US" dirty="0"/>
                     </a:p>
                   </a:txBody>
                   <a:tcPr/>
@@ -5835,7 +5875,7 @@
                     <a:lstStyle/>
                     <a:p>
                       <a:r>
-                        <a:rPr lang="en-US" dirty="0" smtClean="0"/>
+                        <a:rPr lang="en-US" dirty="0"/>
                         <a:t>None</a:t>
                       </a:r>
                     </a:p>
@@ -5855,7 +5895,7 @@
                     <a:lstStyle/>
                     <a:p>
                       <a:r>
-                        <a:rPr lang="en-US" dirty="0" err="1" smtClean="0"/>
+                        <a:rPr lang="en-US" dirty="0" err="1"/>
                         <a:t>OpenStreetMap</a:t>
                       </a:r>
                       <a:endParaRPr lang="en-US" dirty="0"/>
@@ -5869,7 +5909,7 @@
                     <a:lstStyle/>
                     <a:p>
                       <a:r>
-                        <a:rPr lang="en-US" dirty="0" smtClean="0"/>
+                        <a:rPr lang="en-US" dirty="0"/>
                         <a:t>None</a:t>
                       </a:r>
                     </a:p>
@@ -5939,10 +5979,9 @@
           <a:lstStyle/>
           <a:p>
             <a:r>
-              <a:rPr lang="en-US" dirty="0" smtClean="0"/>
+              <a:rPr lang="en-US" dirty="0"/>
               <a:t>Code Monkey</a:t>
             </a:r>
-            <a:endParaRPr lang="en-US" dirty="0"/>
           </a:p>
         </p:txBody>
       </p:sp>
@@ -5969,10 +6008,9 @@
           <a:lstStyle/>
           <a:p>
             <a:r>
-              <a:rPr lang="en-US" dirty="0" smtClean="0"/>
+              <a:rPr lang="en-US" dirty="0"/>
               <a:t>April 5, 2017</a:t>
             </a:r>
-            <a:endParaRPr lang="en-US" dirty="0"/>
           </a:p>
         </p:txBody>
       </p:sp>
@@ -5998,13 +6036,6 @@
       </p:transition>
     </mc:Fallback>
   </mc:AlternateContent>
-  <p:timing>
-    <p:tnLst>
-      <p:par>
-        <p:cTn id="1" dur="indefinite" restart="never" nodeType="tmRoot"/>
-      </p:par>
-    </p:tnLst>
-  </p:timing>
 </p:sld>
 </file>
 
@@ -6041,10 +6072,9 @@
           <a:lstStyle/>
           <a:p>
             <a:r>
-              <a:rPr lang="en-US" dirty="0" smtClean="0"/>
+              <a:rPr lang="en-US" dirty="0"/>
               <a:t>Technology Plan</a:t>
             </a:r>
-            <a:endParaRPr lang="en-US" dirty="0"/>
           </a:p>
         </p:txBody>
       </p:sp>
@@ -6106,10 +6136,9 @@
                     <a:lstStyle/>
                     <a:p>
                       <a:r>
-                        <a:rPr lang="en-US" dirty="0" smtClean="0"/>
+                        <a:rPr lang="en-US" dirty="0"/>
                         <a:t>Experience Rating</a:t>
                       </a:r>
-                      <a:endParaRPr lang="en-US" dirty="0"/>
                     </a:p>
                   </a:txBody>
                   <a:tcPr/>
@@ -6127,10 +6156,9 @@
                     <a:lstStyle/>
                     <a:p>
                       <a:r>
-                        <a:rPr lang="en-US" dirty="0" smtClean="0"/>
+                        <a:rPr lang="en-US" dirty="0"/>
                         <a:t>Application &amp; Web Development</a:t>
                       </a:r>
-                      <a:endParaRPr lang="en-US" dirty="0"/>
                     </a:p>
                   </a:txBody>
                   <a:tcPr/>
@@ -6158,10 +6186,9 @@
                     <a:lstStyle/>
                     <a:p>
                       <a:r>
-                        <a:rPr lang="en-US" dirty="0" smtClean="0"/>
+                        <a:rPr lang="en-US" dirty="0"/>
                         <a:t>Java</a:t>
                       </a:r>
-                      <a:endParaRPr lang="en-US" dirty="0"/>
                     </a:p>
                   </a:txBody>
                   <a:tcPr/>
@@ -6172,10 +6199,9 @@
                     <a:lstStyle/>
                     <a:p>
                       <a:r>
-                        <a:rPr lang="en-US" dirty="0" smtClean="0"/>
+                        <a:rPr lang="en-US" dirty="0"/>
                         <a:t>Small Scale</a:t>
                       </a:r>
-                      <a:endParaRPr lang="en-US" dirty="0"/>
                     </a:p>
                   </a:txBody>
                   <a:tcPr/>
@@ -6193,10 +6219,9 @@
                     <a:lstStyle/>
                     <a:p>
                       <a:r>
-                        <a:rPr lang="en-US" dirty="0" smtClean="0"/>
+                        <a:rPr lang="en-US" dirty="0"/>
                         <a:t>Swift</a:t>
                       </a:r>
-                      <a:endParaRPr lang="en-US" dirty="0"/>
                     </a:p>
                   </a:txBody>
                   <a:tcPr/>
@@ -6207,10 +6232,9 @@
                     <a:lstStyle/>
                     <a:p>
                       <a:r>
-                        <a:rPr lang="en-US" dirty="0" smtClean="0"/>
+                        <a:rPr lang="en-US" dirty="0"/>
                         <a:t>Tutorial</a:t>
                       </a:r>
-                      <a:endParaRPr lang="en-US" dirty="0"/>
                     </a:p>
                   </a:txBody>
                   <a:tcPr/>
@@ -6228,10 +6252,9 @@
                     <a:lstStyle/>
                     <a:p>
                       <a:r>
-                        <a:rPr lang="en-US" dirty="0" smtClean="0"/>
+                        <a:rPr lang="en-US" dirty="0"/>
                         <a:t>HTML 5</a:t>
                       </a:r>
-                      <a:endParaRPr lang="en-US" dirty="0"/>
                     </a:p>
                   </a:txBody>
                   <a:tcPr/>
@@ -6242,10 +6265,9 @@
                     <a:lstStyle/>
                     <a:p>
                       <a:r>
-                        <a:rPr lang="en-US" dirty="0" smtClean="0"/>
+                        <a:rPr lang="en-US" dirty="0"/>
                         <a:t>Small Scale</a:t>
                       </a:r>
-                      <a:endParaRPr lang="en-US" dirty="0"/>
                     </a:p>
                   </a:txBody>
                   <a:tcPr/>
@@ -6263,7 +6285,7 @@
                     <a:lstStyle/>
                     <a:p>
                       <a:r>
-                        <a:rPr lang="en-US" dirty="0" err="1" smtClean="0"/>
+                        <a:rPr lang="en-US" dirty="0" err="1"/>
                         <a:t>Javascript</a:t>
                       </a:r>
                       <a:endParaRPr lang="en-US" dirty="0"/>
@@ -6277,10 +6299,9 @@
                     <a:lstStyle/>
                     <a:p>
                       <a:r>
-                        <a:rPr lang="en-US" dirty="0" smtClean="0"/>
+                        <a:rPr lang="en-US" dirty="0"/>
                         <a:t>Tutorial</a:t>
                       </a:r>
-                      <a:endParaRPr lang="en-US" dirty="0"/>
                     </a:p>
                   </a:txBody>
                   <a:tcPr/>
@@ -6348,10 +6369,9 @@
           <a:lstStyle/>
           <a:p>
             <a:r>
-              <a:rPr lang="en-US" dirty="0" smtClean="0"/>
+              <a:rPr lang="en-US" dirty="0"/>
               <a:t>Code Monkey</a:t>
             </a:r>
-            <a:endParaRPr lang="en-US" dirty="0"/>
           </a:p>
         </p:txBody>
       </p:sp>
@@ -6378,10 +6398,9 @@
           <a:lstStyle/>
           <a:p>
             <a:r>
-              <a:rPr lang="en-US" dirty="0" smtClean="0"/>
+              <a:rPr lang="en-US" dirty="0"/>
               <a:t>April 5, 2017</a:t>
             </a:r>
-            <a:endParaRPr lang="en-US" dirty="0"/>
           </a:p>
         </p:txBody>
       </p:sp>
@@ -6407,13 +6426,6 @@
       </p:transition>
     </mc:Fallback>
   </mc:AlternateContent>
-  <p:timing>
-    <p:tnLst>
-      <p:par>
-        <p:cTn id="1" dur="indefinite" restart="never" nodeType="tmRoot"/>
-      </p:par>
-    </p:tnLst>
-  </p:timing>
 </p:sld>
 </file>
 
@@ -6450,10 +6462,9 @@
           <a:lstStyle/>
           <a:p>
             <a:r>
-              <a:rPr lang="en-US" dirty="0" smtClean="0"/>
+              <a:rPr lang="en-US" dirty="0"/>
               <a:t>Risk Analysis</a:t>
             </a:r>
-            <a:endParaRPr lang="en-US" dirty="0"/>
           </a:p>
         </p:txBody>
       </p:sp>
@@ -6505,10 +6516,9 @@
                     <a:lstStyle/>
                     <a:p>
                       <a:r>
-                        <a:rPr lang="en-US" dirty="0" smtClean="0"/>
+                        <a:rPr lang="en-US" dirty="0"/>
                         <a:t>Risk</a:t>
                       </a:r>
-                      <a:endParaRPr lang="en-US" dirty="0"/>
                     </a:p>
                   </a:txBody>
                   <a:tcPr/>
@@ -6519,10 +6529,9 @@
                     <a:lstStyle/>
                     <a:p>
                       <a:r>
-                        <a:rPr lang="en-US" dirty="0" smtClean="0"/>
+                        <a:rPr lang="en-US" dirty="0"/>
                         <a:t>Mitigation</a:t>
                       </a:r>
-                      <a:endParaRPr lang="en-US" dirty="0"/>
                     </a:p>
                   </a:txBody>
                   <a:tcPr/>
@@ -6540,10 +6549,9 @@
                     <a:lstStyle/>
                     <a:p>
                       <a:r>
-                        <a:rPr lang="en-US" dirty="0" smtClean="0"/>
+                        <a:rPr lang="en-US" dirty="0"/>
                         <a:t>No experience with IOS development</a:t>
                       </a:r>
-                      <a:endParaRPr lang="en-US" dirty="0"/>
                     </a:p>
                   </a:txBody>
                   <a:tcPr/>
@@ -6554,10 +6562,9 @@
                     <a:lstStyle/>
                     <a:p>
                       <a:r>
-                        <a:rPr lang="en-US" dirty="0" smtClean="0"/>
+                        <a:rPr lang="en-US" dirty="0"/>
                         <a:t>Schedule time and work through tutorials</a:t>
                       </a:r>
-                      <a:endParaRPr lang="en-US" dirty="0"/>
                     </a:p>
                   </a:txBody>
                   <a:tcPr/>
@@ -6575,11 +6582,11 @@
                     <a:lstStyle/>
                     <a:p>
                       <a:r>
-                        <a:rPr lang="en-US" dirty="0" smtClean="0"/>
+                        <a:rPr lang="en-US" dirty="0"/>
                         <a:t>No experience with Android</a:t>
                       </a:r>
                       <a:r>
-                        <a:rPr lang="en-US" baseline="0" dirty="0" smtClean="0"/>
+                        <a:rPr lang="en-US" baseline="0" dirty="0"/>
                         <a:t> development</a:t>
                       </a:r>
                       <a:endParaRPr lang="en-US" dirty="0"/>
@@ -6593,11 +6600,11 @@
                     <a:lstStyle/>
                     <a:p>
                       <a:r>
-                        <a:rPr lang="en-US" dirty="0" smtClean="0"/>
+                        <a:rPr lang="en-US" dirty="0"/>
                         <a:t>Schedule time</a:t>
                       </a:r>
                       <a:r>
-                        <a:rPr lang="en-US" baseline="0" dirty="0" smtClean="0"/>
+                        <a:rPr lang="en-US" baseline="0" dirty="0"/>
                         <a:t> and work through tutorials</a:t>
                       </a:r>
                       <a:endParaRPr lang="en-US" dirty="0"/>
@@ -6618,11 +6625,11 @@
                     <a:lstStyle/>
                     <a:p>
                       <a:r>
-                        <a:rPr lang="en-US" dirty="0" smtClean="0"/>
+                        <a:rPr lang="en-US" dirty="0"/>
                         <a:t>Limited experience</a:t>
                       </a:r>
                       <a:r>
-                        <a:rPr lang="en-US" baseline="0" dirty="0" smtClean="0"/>
+                        <a:rPr lang="en-US" baseline="0" dirty="0"/>
                         <a:t> with app development</a:t>
                       </a:r>
                       <a:endParaRPr lang="en-US" dirty="0"/>
@@ -6636,10 +6643,9 @@
                     <a:lstStyle/>
                     <a:p>
                       <a:r>
-                        <a:rPr lang="en-US" dirty="0" smtClean="0"/>
+                        <a:rPr lang="en-US" dirty="0"/>
                         <a:t>Schedule time and work tutorials</a:t>
                       </a:r>
-                      <a:endParaRPr lang="en-US" dirty="0"/>
                     </a:p>
                   </a:txBody>
                   <a:tcPr/>
@@ -6657,10 +6663,9 @@
                     <a:lstStyle/>
                     <a:p>
                       <a:r>
-                        <a:rPr lang="en-US" dirty="0" smtClean="0"/>
+                        <a:rPr lang="en-US" dirty="0"/>
                         <a:t>Team member conflicting schedules</a:t>
                       </a:r>
-                      <a:endParaRPr lang="en-US" dirty="0"/>
                     </a:p>
                   </a:txBody>
                   <a:tcPr/>
@@ -6671,10 +6676,9 @@
                     <a:lstStyle/>
                     <a:p>
                       <a:r>
-                        <a:rPr lang="en-US" dirty="0" smtClean="0"/>
+                        <a:rPr lang="en-US" dirty="0"/>
                         <a:t>Plan meetings for in advance</a:t>
                       </a:r>
-                      <a:endParaRPr lang="en-US" dirty="0"/>
                     </a:p>
                   </a:txBody>
                   <a:tcPr/>
@@ -6692,11 +6696,11 @@
                     <a:lstStyle/>
                     <a:p>
                       <a:r>
-                        <a:rPr lang="en-US" dirty="0" smtClean="0"/>
+                        <a:rPr lang="en-US" dirty="0"/>
                         <a:t>No experience accessing GPS</a:t>
                       </a:r>
                       <a:r>
-                        <a:rPr lang="en-US" baseline="0" dirty="0" smtClean="0"/>
+                        <a:rPr lang="en-US" baseline="0" dirty="0"/>
                         <a:t> in mobile apps</a:t>
                       </a:r>
                       <a:endParaRPr lang="en-US" dirty="0"/>
@@ -6710,10 +6714,9 @@
                     <a:lstStyle/>
                     <a:p>
                       <a:r>
-                        <a:rPr lang="en-US" dirty="0" smtClean="0"/>
+                        <a:rPr lang="en-US" dirty="0"/>
                         <a:t>Schedule time to learn and work through tutorials</a:t>
                       </a:r>
-                      <a:endParaRPr lang="en-US" dirty="0"/>
                     </a:p>
                   </a:txBody>
                   <a:tcPr/>
@@ -6731,11 +6734,11 @@
                     <a:lstStyle/>
                     <a:p>
                       <a:r>
-                        <a:rPr lang="en-US" dirty="0" smtClean="0"/>
+                        <a:rPr lang="en-US" dirty="0"/>
                         <a:t>No experience</a:t>
                       </a:r>
                       <a:r>
-                        <a:rPr lang="en-US" baseline="0" dirty="0" smtClean="0"/>
+                        <a:rPr lang="en-US" baseline="0" dirty="0"/>
                         <a:t> with utilizing Google Maps in mobile apps</a:t>
                       </a:r>
                       <a:endParaRPr lang="en-US" dirty="0"/>
@@ -6749,10 +6752,9 @@
                     <a:lstStyle/>
                     <a:p>
                       <a:r>
-                        <a:rPr lang="en-US" dirty="0" smtClean="0"/>
+                        <a:rPr lang="en-US" dirty="0"/>
                         <a:t>Schedule time to learn and work through tutorials</a:t>
                       </a:r>
-                      <a:endParaRPr lang="en-US" dirty="0"/>
                     </a:p>
                   </a:txBody>
                   <a:tcPr/>
@@ -6820,10 +6822,9 @@
           <a:lstStyle/>
           <a:p>
             <a:r>
-              <a:rPr lang="en-US" dirty="0" smtClean="0"/>
+              <a:rPr lang="en-US" dirty="0"/>
               <a:t>Code Monkey</a:t>
             </a:r>
-            <a:endParaRPr lang="en-US" dirty="0"/>
           </a:p>
         </p:txBody>
       </p:sp>
@@ -6850,10 +6851,9 @@
           <a:lstStyle/>
           <a:p>
             <a:r>
-              <a:rPr lang="en-US" dirty="0" smtClean="0"/>
+              <a:rPr lang="en-US" dirty="0"/>
               <a:t>April 5, 2017</a:t>
             </a:r>
-            <a:endParaRPr lang="en-US" dirty="0"/>
           </a:p>
         </p:txBody>
       </p:sp>
@@ -6879,13 +6879,6 @@
       </p:transition>
     </mc:Fallback>
   </mc:AlternateContent>
-  <p:timing>
-    <p:tnLst>
-      <p:par>
-        <p:cTn id="1" dur="indefinite" restart="never" nodeType="tmRoot"/>
-      </p:par>
-    </p:tnLst>
-  </p:timing>
 </p:sld>
 </file>
 
@@ -6922,10 +6915,9 @@
           <a:lstStyle/>
           <a:p>
             <a:r>
-              <a:rPr lang="en-US" dirty="0" smtClean="0"/>
+              <a:rPr lang="en-US" dirty="0"/>
               <a:t>Effort Estimate</a:t>
             </a:r>
-            <a:endParaRPr lang="en-US" dirty="0"/>
           </a:p>
         </p:txBody>
       </p:sp>
@@ -6991,10 +6983,9 @@
                     <a:lstStyle/>
                     <a:p>
                       <a:r>
-                        <a:rPr lang="en-US" dirty="0" smtClean="0"/>
+                        <a:rPr lang="en-US" dirty="0"/>
                         <a:t>Screen/Report</a:t>
                       </a:r>
-                      <a:endParaRPr lang="en-US" dirty="0"/>
                     </a:p>
                   </a:txBody>
                   <a:tcPr/>
@@ -7005,10 +6996,9 @@
                     <a:lstStyle/>
                     <a:p>
                       <a:r>
-                        <a:rPr lang="en-US" dirty="0" smtClean="0"/>
+                        <a:rPr lang="en-US" dirty="0"/>
                         <a:t>Complexity</a:t>
                       </a:r>
-                      <a:endParaRPr lang="en-US" dirty="0"/>
                     </a:p>
                   </a:txBody>
                   <a:tcPr/>
@@ -7019,10 +7009,9 @@
                     <a:lstStyle/>
                     <a:p>
                       <a:r>
-                        <a:rPr lang="en-US" dirty="0" smtClean="0"/>
+                        <a:rPr lang="en-US" dirty="0"/>
                         <a:t>Object Points</a:t>
                       </a:r>
-                      <a:endParaRPr lang="en-US" dirty="0"/>
                     </a:p>
                   </a:txBody>
                   <a:tcPr/>
@@ -7033,10 +7022,9 @@
                     <a:lstStyle/>
                     <a:p>
                       <a:r>
-                        <a:rPr lang="en-US" dirty="0" smtClean="0"/>
+                        <a:rPr lang="en-US" dirty="0"/>
                         <a:t>Notes</a:t>
                       </a:r>
-                      <a:endParaRPr lang="en-US" dirty="0"/>
                     </a:p>
                   </a:txBody>
                   <a:tcPr/>
@@ -7102,13 +7090,7 @@
                         <a:rPr lang="en-US" dirty="0">
                           <a:effectLst/>
                         </a:rPr>
-                        <a:t>Screen will be constructed by reading Drury location from the data source</a:t>
-                      </a:r>
-                      <a:r>
-                        <a:rPr lang="en-US" dirty="0" smtClean="0">
-                          <a:effectLst/>
-                        </a:rPr>
-                        <a:t>.</a:t>
+                        <a:t>Screen will be constructed by reading Drury location from the data source.</a:t>
                       </a:r>
                     </a:p>
                   </a:txBody>
@@ -7372,10 +7354,9 @@
           <a:lstStyle/>
           <a:p>
             <a:r>
-              <a:rPr lang="en-US" dirty="0" smtClean="0"/>
+              <a:rPr lang="en-US" dirty="0"/>
               <a:t>Code Monkey</a:t>
             </a:r>
-            <a:endParaRPr lang="en-US" dirty="0"/>
           </a:p>
         </p:txBody>
       </p:sp>
@@ -7402,10 +7383,9 @@
           <a:lstStyle/>
           <a:p>
             <a:r>
-              <a:rPr lang="en-US" dirty="0" smtClean="0"/>
+              <a:rPr lang="en-US" dirty="0"/>
               <a:t>April 5, 2017</a:t>
             </a:r>
-            <a:endParaRPr lang="en-US" dirty="0"/>
           </a:p>
         </p:txBody>
       </p:sp>
@@ -7431,13 +7411,6 @@
       </p:transition>
     </mc:Fallback>
   </mc:AlternateContent>
-  <p:timing>
-    <p:tnLst>
-      <p:par>
-        <p:cTn id="1" dur="indefinite" restart="never" nodeType="tmRoot"/>
-      </p:par>
-    </p:tnLst>
-  </p:timing>
 </p:sld>
 </file>
 
@@ -7542,10 +7515,9 @@
                     <a:lstStyle/>
                     <a:p>
                       <a:r>
-                        <a:rPr lang="en-US" dirty="0" smtClean="0"/>
+                        <a:rPr lang="en-US" dirty="0"/>
                         <a:t>Screen/Report</a:t>
                       </a:r>
-                      <a:endParaRPr lang="en-US" dirty="0"/>
                     </a:p>
                   </a:txBody>
                   <a:tcPr/>
@@ -7556,10 +7528,9 @@
                     <a:lstStyle/>
                     <a:p>
                       <a:r>
-                        <a:rPr lang="en-US" dirty="0" smtClean="0"/>
+                        <a:rPr lang="en-US" dirty="0"/>
                         <a:t>Complexity</a:t>
                       </a:r>
-                      <a:endParaRPr lang="en-US" dirty="0"/>
                     </a:p>
                   </a:txBody>
                   <a:tcPr/>
@@ -7570,10 +7541,9 @@
                     <a:lstStyle/>
                     <a:p>
                       <a:r>
-                        <a:rPr lang="en-US" dirty="0" smtClean="0"/>
+                        <a:rPr lang="en-US" dirty="0"/>
                         <a:t>Object Points</a:t>
                       </a:r>
-                      <a:endParaRPr lang="en-US" dirty="0"/>
                     </a:p>
                   </a:txBody>
                   <a:tcPr/>
@@ -7584,10 +7554,9 @@
                     <a:lstStyle/>
                     <a:p>
                       <a:r>
-                        <a:rPr lang="en-US" dirty="0" smtClean="0"/>
+                        <a:rPr lang="en-US" dirty="0"/>
                         <a:t>Notes</a:t>
                       </a:r>
-                      <a:endParaRPr lang="en-US" dirty="0"/>
                     </a:p>
                   </a:txBody>
                   <a:tcPr/>
@@ -7684,44 +7653,23 @@
                         <a:rPr lang="en-US" dirty="0">
                           <a:effectLst/>
                         </a:rPr>
-                        <a:t>1</a:t>
+                        <a:t>1@10</a:t>
                       </a:r>
-                      <a:r>
-                        <a:rPr lang="en-US" dirty="0" smtClean="0">
-                          <a:effectLst/>
-                        </a:rPr>
-                        <a:t>@</a:t>
-                      </a:r>
+                    </a:p>
+                  </a:txBody>
+                  <a:tcPr marL="123825" marR="123825" marT="57150" marB="57150" anchor="ctr"/>
+                </a:tc>
+                <a:tc>
+                  <a:txBody>
+                    <a:bodyPr/>
+                    <a:lstStyle/>
+                    <a:p>
                       <a:r>
                         <a:rPr lang="en-US" dirty="0">
                           <a:effectLst/>
                         </a:rPr>
                         <a:t>10</a:t>
                       </a:r>
-                    </a:p>
-                  </a:txBody>
-                  <a:tcPr marL="123825" marR="123825" marT="57150" marB="57150" anchor="ctr"/>
-                </a:tc>
-                <a:tc>
-                  <a:txBody>
-                    <a:bodyPr/>
-                    <a:lstStyle/>
-                    <a:p>
-                      <a:r>
-                        <a:rPr lang="en-US" dirty="0">
-                          <a:effectLst/>
-                        </a:rPr>
-                        <a:t>1</a:t>
-                      </a:r>
-                      <a:r>
-                        <a:rPr lang="en-US" dirty="0" smtClean="0">
-                          <a:effectLst/>
-                        </a:rPr>
-                        <a:t>0</a:t>
-                      </a:r>
-                      <a:endParaRPr lang="en-US" dirty="0">
-                        <a:effectLst/>
-                      </a:endParaRPr>
                     </a:p>
                   </a:txBody>
                   <a:tcPr marL="123825" marR="123825" marT="57150" marB="57150" anchor="ctr"/>
@@ -7772,44 +7720,23 @@
                         <a:rPr lang="en-US" dirty="0">
                           <a:effectLst/>
                         </a:rPr>
-                        <a:t>2</a:t>
+                        <a:t>2@10</a:t>
                       </a:r>
-                      <a:r>
-                        <a:rPr lang="en-US" dirty="0" smtClean="0">
-                          <a:effectLst/>
-                        </a:rPr>
-                        <a:t>@</a:t>
-                      </a:r>
+                    </a:p>
+                  </a:txBody>
+                  <a:tcPr marL="123825" marR="123825" marT="57150" marB="57150" anchor="ctr"/>
+                </a:tc>
+                <a:tc>
+                  <a:txBody>
+                    <a:bodyPr/>
+                    <a:lstStyle/>
+                    <a:p>
                       <a:r>
                         <a:rPr lang="en-US" dirty="0">
                           <a:effectLst/>
                         </a:rPr>
-                        <a:t>10</a:t>
+                        <a:t>20</a:t>
                       </a:r>
-                    </a:p>
-                  </a:txBody>
-                  <a:tcPr marL="123825" marR="123825" marT="57150" marB="57150" anchor="ctr"/>
-                </a:tc>
-                <a:tc>
-                  <a:txBody>
-                    <a:bodyPr/>
-                    <a:lstStyle/>
-                    <a:p>
-                      <a:r>
-                        <a:rPr lang="en-US" dirty="0">
-                          <a:effectLst/>
-                        </a:rPr>
-                        <a:t>2</a:t>
-                      </a:r>
-                      <a:r>
-                        <a:rPr lang="en-US" dirty="0" smtClean="0">
-                          <a:effectLst/>
-                        </a:rPr>
-                        <a:t>0</a:t>
-                      </a:r>
-                      <a:endParaRPr lang="en-US" dirty="0">
-                        <a:effectLst/>
-                      </a:endParaRPr>
                     </a:p>
                   </a:txBody>
                   <a:tcPr marL="123825" marR="123825" marT="57150" marB="57150" anchor="ctr"/>
@@ -7869,14 +7796,11 @@
                     <a:lstStyle/>
                     <a:p>
                       <a:r>
-                        <a:rPr lang="en-US" dirty="0" smtClean="0">
+                        <a:rPr lang="en-US" dirty="0">
                           <a:effectLst/>
                         </a:rPr>
                         <a:t>34</a:t>
                       </a:r>
-                      <a:endParaRPr lang="en-US" dirty="0">
-                        <a:effectLst/>
-                      </a:endParaRPr>
                     </a:p>
                   </a:txBody>
                   <a:tcPr marL="123825" marR="123825" marT="57150" marB="57150" anchor="ctr"/>
@@ -7959,10 +7883,9 @@
           <a:lstStyle/>
           <a:p>
             <a:r>
-              <a:rPr lang="en-US" dirty="0" smtClean="0"/>
+              <a:rPr lang="en-US" dirty="0"/>
               <a:t>Code Monkey</a:t>
             </a:r>
-            <a:endParaRPr lang="en-US" dirty="0"/>
           </a:p>
         </p:txBody>
       </p:sp>
@@ -7989,10 +7912,9 @@
           <a:lstStyle/>
           <a:p>
             <a:r>
-              <a:rPr lang="en-US" dirty="0" smtClean="0"/>
+              <a:rPr lang="en-US" dirty="0"/>
               <a:t>April 5, 2017</a:t>
             </a:r>
-            <a:endParaRPr lang="en-US" dirty="0"/>
           </a:p>
         </p:txBody>
       </p:sp>
@@ -8018,13 +7940,6 @@
       </p:transition>
     </mc:Fallback>
   </mc:AlternateContent>
-  <p:timing>
-    <p:tnLst>
-      <p:par>
-        <p:cTn id="1" dur="indefinite" restart="never" nodeType="tmRoot"/>
-      </p:par>
-    </p:tnLst>
-  </p:timing>
 </p:sld>
 </file>
 
@@ -8061,10 +7976,9 @@
           <a:lstStyle/>
           <a:p>
             <a:r>
-              <a:rPr lang="en-US" dirty="0" smtClean="0"/>
+              <a:rPr lang="en-US" dirty="0"/>
               <a:t>Effort Estimate</a:t>
             </a:r>
-            <a:endParaRPr lang="en-US" dirty="0"/>
           </a:p>
         </p:txBody>
       </p:sp>
@@ -8164,12 +8078,8 @@
               <a:t>Effort(PM) = 159/10 = 15.9 person </a:t>
             </a:r>
             <a:r>
-              <a:rPr lang="en-US" dirty="0" err="1" smtClean="0"/>
-              <a:t>months</a:t>
-            </a:r>
-            <a:r>
               <a:rPr lang="en-US" dirty="0" err="1"/>
-              <a:t>Productivity</a:t>
+              <a:t>monthsProductivity</a:t>
             </a:r>
             <a:r>
               <a:rPr lang="en-US" dirty="0"/>
@@ -8243,13 +8153,8 @@
             <a:pPr lvl="1"/>
             <a:r>
               <a:rPr lang="en-US" dirty="0"/>
-              <a:t>Effort(PM) = 159/10 = 15.9 person </a:t>
-            </a:r>
-            <a:r>
-              <a:rPr lang="en-US" dirty="0" smtClean="0"/>
-              <a:t>months</a:t>
-            </a:r>
-            <a:endParaRPr lang="en-US" dirty="0"/>
+              <a:t>Effort(PM) = 159/10 = 15.9 person months</a:t>
+            </a:r>
           </a:p>
         </p:txBody>
       </p:sp>
@@ -8306,10 +8211,9 @@
           <a:lstStyle/>
           <a:p>
             <a:r>
-              <a:rPr lang="en-US" dirty="0" smtClean="0"/>
+              <a:rPr lang="en-US" dirty="0"/>
               <a:t>Code Monkey</a:t>
             </a:r>
-            <a:endParaRPr lang="en-US" dirty="0"/>
           </a:p>
         </p:txBody>
       </p:sp>
@@ -8336,10 +8240,9 @@
           <a:lstStyle/>
           <a:p>
             <a:r>
-              <a:rPr lang="en-US" dirty="0" smtClean="0"/>
+              <a:rPr lang="en-US" dirty="0"/>
               <a:t>April 5, 2017</a:t>
             </a:r>
-            <a:endParaRPr lang="en-US" dirty="0"/>
           </a:p>
         </p:txBody>
       </p:sp>
@@ -8365,13 +8268,6 @@
       </p:transition>
     </mc:Fallback>
   </mc:AlternateContent>
-  <p:timing>
-    <p:tnLst>
-      <p:par>
-        <p:cTn id="1" dur="indefinite" restart="never" nodeType="tmRoot"/>
-      </p:par>
-    </p:tnLst>
-  </p:timing>
 </p:sld>
 </file>
 

</xml_diff>